<commit_message>
Updated PowerPoint and Word document
</commit_message>
<xml_diff>
--- a/US Housing Market Analysis_Final_1-20-2020.pptx
+++ b/US Housing Market Analysis_Final_1-20-2020.pptx
@@ -2467,7 +2467,7 @@
         <a:p>
           <a:r>
             <a:rPr lang="en-US" sz="1400" dirty="0"/>
-            <a:t>Wanted to make an analysis to help potential homeowners better understand the housing market (e.g. how are prices trending, where’s cheaper/more expensive, etc.)</a:t>
+            <a:t>Wanted to make an analysis to help potential homeowners better understand the housing market (e.g. how are prices trending, where it’s cheaper/more expensive, etc.)</a:t>
           </a:r>
         </a:p>
       </dgm:t>
@@ -2577,10 +2577,24 @@
     <dgm:pt modelId="{81F3D8E3-0F58-45D9-9F5C-70A48FBECED1}" type="parTrans" cxnId="{28580529-27C6-4567-8FC6-8CA20443CACF}">
       <dgm:prSet/>
       <dgm:spPr/>
+      <dgm:t>
+        <a:bodyPr/>
+        <a:lstStyle/>
+        <a:p>
+          <a:endParaRPr lang="en-US"/>
+        </a:p>
+      </dgm:t>
     </dgm:pt>
     <dgm:pt modelId="{90171506-8C6E-4314-840E-37D4F541AA5E}" type="sibTrans" cxnId="{28580529-27C6-4567-8FC6-8CA20443CACF}">
       <dgm:prSet/>
       <dgm:spPr/>
+      <dgm:t>
+        <a:bodyPr/>
+        <a:lstStyle/>
+        <a:p>
+          <a:endParaRPr lang="en-US"/>
+        </a:p>
+      </dgm:t>
     </dgm:pt>
     <dgm:pt modelId="{650D3F43-4F5C-46AE-9113-AFBB00179D2E}">
       <dgm:prSet phldrT="[Text]"/>
@@ -2596,10 +2610,24 @@
     <dgm:pt modelId="{3663C2CA-1970-450A-8D91-86CB11588442}" type="parTrans" cxnId="{1949E950-86AB-4ABF-8F9A-C2E243477118}">
       <dgm:prSet/>
       <dgm:spPr/>
+      <dgm:t>
+        <a:bodyPr/>
+        <a:lstStyle/>
+        <a:p>
+          <a:endParaRPr lang="en-US"/>
+        </a:p>
+      </dgm:t>
     </dgm:pt>
     <dgm:pt modelId="{B4588B80-0376-404B-9E2D-49E0411AFAD2}" type="sibTrans" cxnId="{1949E950-86AB-4ABF-8F9A-C2E243477118}">
       <dgm:prSet/>
       <dgm:spPr/>
+      <dgm:t>
+        <a:bodyPr/>
+        <a:lstStyle/>
+        <a:p>
+          <a:endParaRPr lang="en-US"/>
+        </a:p>
+      </dgm:t>
     </dgm:pt>
     <dgm:pt modelId="{F7242007-FC27-4D83-8C9F-35187A093FB2}">
       <dgm:prSet/>
@@ -2648,10 +2676,24 @@
     <dgm:pt modelId="{52AB6AD1-3C12-48B9-8542-7548FB563B6C}" type="parTrans" cxnId="{517320EA-FC8E-44F1-9695-31A603E9BDC4}">
       <dgm:prSet/>
       <dgm:spPr/>
+      <dgm:t>
+        <a:bodyPr/>
+        <a:lstStyle/>
+        <a:p>
+          <a:endParaRPr lang="en-US"/>
+        </a:p>
+      </dgm:t>
     </dgm:pt>
     <dgm:pt modelId="{47A1E20E-4DF5-4AFC-93C9-E09AD7DE8423}" type="sibTrans" cxnId="{517320EA-FC8E-44F1-9695-31A603E9BDC4}">
       <dgm:prSet/>
       <dgm:spPr/>
+      <dgm:t>
+        <a:bodyPr/>
+        <a:lstStyle/>
+        <a:p>
+          <a:endParaRPr lang="en-US"/>
+        </a:p>
+      </dgm:t>
     </dgm:pt>
     <dgm:pt modelId="{44F59B5B-2475-4462-9031-41DED64B63BE}">
       <dgm:prSet phldrT="[Text]"/>
@@ -2667,10 +2709,24 @@
     <dgm:pt modelId="{765B66D2-636F-4106-A3A8-89FFA89C45B8}" type="parTrans" cxnId="{D4EC8443-EEF1-47D2-B319-439F41BD61B6}">
       <dgm:prSet/>
       <dgm:spPr/>
+      <dgm:t>
+        <a:bodyPr/>
+        <a:lstStyle/>
+        <a:p>
+          <a:endParaRPr lang="en-US"/>
+        </a:p>
+      </dgm:t>
     </dgm:pt>
     <dgm:pt modelId="{C5577E32-6E29-4F20-A4A3-AC868E81128E}" type="sibTrans" cxnId="{D4EC8443-EEF1-47D2-B319-439F41BD61B6}">
       <dgm:prSet/>
       <dgm:spPr/>
+      <dgm:t>
+        <a:bodyPr/>
+        <a:lstStyle/>
+        <a:p>
+          <a:endParaRPr lang="en-US"/>
+        </a:p>
+      </dgm:t>
     </dgm:pt>
     <dgm:pt modelId="{F23C2260-7608-4CAE-BDE0-C997F66C3AFA}" type="pres">
       <dgm:prSet presAssocID="{0EB549BA-B7DC-47B3-A16B-D0EEAC6CD60C}" presName="Name0" presStyleCnt="0">
@@ -2894,7 +2950,7 @@
         <a:p>
           <a:r>
             <a:rPr lang="en-US" sz="2000" dirty="0"/>
-            <a:t>Identified which the types of data we would need</a:t>
+            <a:t>Identified which types of data we would need</a:t>
           </a:r>
         </a:p>
       </dgm:t>
@@ -3404,7 +3460,7 @@
           </a:pPr>
           <a:r>
             <a:rPr lang="en-US" sz="1400" kern="1200" dirty="0"/>
-            <a:t>Wanted to make an analysis to help potential homeowners better understand the housing market (e.g. how are prices trending, where’s cheaper/more expensive, etc.)</a:t>
+            <a:t>Wanted to make an analysis to help potential homeowners better understand the housing market (e.g. how are prices trending, where it’s cheaper/more expensive, etc.)</a:t>
           </a:r>
         </a:p>
         <a:p>
@@ -4157,7 +4213,7 @@
           </a:pPr>
           <a:r>
             <a:rPr lang="en-US" sz="2000" kern="1200" dirty="0"/>
-            <a:t>Identified which the types of data we would need</a:t>
+            <a:t>Identified which types of data we would need</a:t>
           </a:r>
         </a:p>
       </dsp:txBody>
@@ -12209,7 +12265,7 @@
                 </a:solidFill>
                 <a:latin typeface="+mn-lt"/>
               </a:rPr>
-              <a:t>DC, California, Colorado, Washington, and Massachusetts had median sales price increases starting around 2011-2012, which follows a consistent pattern the national median sales price average.</a:t>
+              <a:t>DC, California, Colorado, Washington, and Massachusetts show median sales price increases starting around 2011-2012, which follows a consistent pattern with the national median sales price average.</a:t>
             </a:r>
           </a:p>
         </p:txBody>
@@ -15423,29 +15479,29 @@
           <a:lstStyle/>
           <a:p>
             <a:r>
-              <a:rPr lang="en-US" dirty="0"/>
-              <a:t>We found most answers about the market rebounding:</a:t>
+              <a:rPr lang="en-US" b="1" dirty="0"/>
+              <a:t>We gained insights into the market rebounding:</a:t>
             </a:r>
           </a:p>
           <a:p>
             <a:pPr lvl="1"/>
             <a:r>
               <a:rPr lang="en-US" dirty="0"/>
-              <a:t>Median sales prices increased/foreclosures decreased around ‘11-’12</a:t>
+              <a:t>Median sales prices increased/foreclosures decreased since ‘11-’12</a:t>
             </a:r>
           </a:p>
           <a:p>
             <a:pPr lvl="1"/>
             <a:r>
               <a:rPr lang="en-US" dirty="0"/>
-              <a:t>Most states rebounded around 2011-2012</a:t>
+              <a:t>Most states started to rebound around 2011-2012</a:t>
             </a:r>
           </a:p>
           <a:p>
             <a:pPr lvl="1"/>
             <a:r>
               <a:rPr lang="en-US" dirty="0"/>
-              <a:t>Variables correlated to median sales prices vary state to state</a:t>
+              <a:t>Variables correlated to median sales prices vary from state to state</a:t>
             </a:r>
           </a:p>
           <a:p>
@@ -15461,7 +15517,7 @@
           </a:p>
           <a:p>
             <a:r>
-              <a:rPr lang="en-US" dirty="0"/>
+              <a:rPr lang="en-US" b="1" dirty="0"/>
               <a:t>Things that remain unclear based on our results:</a:t>
             </a:r>
           </a:p>
@@ -15483,7 +15539,7 @@
             <a:pPr lvl="1"/>
             <a:r>
               <a:rPr lang="en-US" dirty="0"/>
-              <a:t>Why did certain variables affect other states more than others? </a:t>
+              <a:t>Why did certain variables affect some states more than others? </a:t>
             </a:r>
           </a:p>
           <a:p>
@@ -15610,8 +15666,8 @@
           <a:lstStyle/>
           <a:p>
             <a:r>
-              <a:rPr lang="en-US" sz="1800" dirty="0"/>
-              <a:t>Key issues we encountered included:</a:t>
+              <a:rPr lang="en-US" sz="1800" b="1" dirty="0"/>
+              <a:t>Key issues we encountered:</a:t>
             </a:r>
           </a:p>
           <a:p>
@@ -15649,7 +15705,7 @@
           </a:p>
           <a:p>
             <a:r>
-              <a:rPr lang="en-US" sz="1800" dirty="0"/>
+              <a:rPr lang="en-US" sz="1800" b="1" dirty="0"/>
               <a:t>Future research recommendations:</a:t>
             </a:r>
           </a:p>
@@ -20063,7 +20119,7 @@
             <p:ph idx="1"/>
             <p:extLst>
               <p:ext uri="{D42A27DB-BD31-4B8C-83A1-F6EECF244321}">
-                <p14:modId xmlns:p14="http://schemas.microsoft.com/office/powerpoint/2010/main" val="2396983787"/>
+                <p14:modId xmlns:p14="http://schemas.microsoft.com/office/powerpoint/2010/main" val="2535220701"/>
               </p:ext>
             </p:extLst>
           </p:nvPr>
@@ -25340,7 +25396,7 @@
             <p:ph idx="1"/>
             <p:extLst>
               <p:ext uri="{D42A27DB-BD31-4B8C-83A1-F6EECF244321}">
-                <p14:modId xmlns:p14="http://schemas.microsoft.com/office/powerpoint/2010/main" val="819975528"/>
+                <p14:modId xmlns:p14="http://schemas.microsoft.com/office/powerpoint/2010/main" val="4267302937"/>
               </p:ext>
             </p:extLst>
           </p:nvPr>
@@ -25565,7 +25621,7 @@
         <p:spPr bwMode="auto">
           <a:xfrm>
             <a:off x="857249" y="1750570"/>
-            <a:ext cx="7429501" cy="539515"/>
+            <a:ext cx="7709702" cy="539515"/>
           </a:xfrm>
           <a:prstGeom prst="rect">
             <a:avLst/>
@@ -25603,7 +25659,7 @@
                 </a:solidFill>
                 <a:latin typeface="+mn-lt"/>
               </a:rPr>
-              <a:t>The national average median sales prices began increasing in 2011 and have continued to increase since then, indicating when the market started to rebound</a:t>
+              <a:t>The national average median sales prices began increasing in 2011 and have continued to increase since then, indicating the market started to rebound in 2011</a:t>
             </a:r>
           </a:p>
         </p:txBody>

</xml_diff>